<commit_message>
Sequence Diagram for remind feature added. DG and JinShibo PPP updated.
</commit_message>
<xml_diff>
--- a/docs/diagrams/UndoRedoSequenceDiagram.pptx
+++ b/docs/diagrams/UndoRedoSequenceDiagram.pptx
@@ -5,10 +5,11 @@
     <p:sldMasterId id="2147483648" r:id="rId1"/>
   </p:sldMasterIdLst>
   <p:notesMasterIdLst>
-    <p:notesMasterId r:id="rId3"/>
+    <p:notesMasterId r:id="rId4"/>
   </p:notesMasterIdLst>
   <p:sldIdLst>
     <p:sldId id="267" r:id="rId2"/>
+    <p:sldId id="268" r:id="rId3"/>
   </p:sldIdLst>
   <p:sldSz cx="9144000" cy="6858000" type="screen4x3"/>
   <p:notesSz cx="6858000" cy="9144000"/>
@@ -208,7 +209,7 @@
           <a:p>
             <a:fld id="{F5CC4B3F-88C1-4FFA-B1B6-F41C21DC6924}" type="datetimeFigureOut">
               <a:rPr lang="en-US" smtClean="0"/>
-              <a:t>09-Apr-19</a:t>
+              <a:t>4/14/19</a:t>
             </a:fld>
             <a:endParaRPr lang="en-US"/>
           </a:p>
@@ -654,7 +655,7 @@
           <a:p>
             <a:fld id="{78C97017-6FC3-485B-9764-EAC9E56C1D49}" type="datetimeFigureOut">
               <a:rPr lang="en-US" smtClean="0"/>
-              <a:t>09-Apr-19</a:t>
+              <a:t>4/14/19</a:t>
             </a:fld>
             <a:endParaRPr lang="en-US"/>
           </a:p>
@@ -822,7 +823,7 @@
           <a:p>
             <a:fld id="{78C97017-6FC3-485B-9764-EAC9E56C1D49}" type="datetimeFigureOut">
               <a:rPr lang="en-US" smtClean="0"/>
-              <a:t>09-Apr-19</a:t>
+              <a:t>4/14/19</a:t>
             </a:fld>
             <a:endParaRPr lang="en-US"/>
           </a:p>
@@ -1000,7 +1001,7 @@
           <a:p>
             <a:fld id="{78C97017-6FC3-485B-9764-EAC9E56C1D49}" type="datetimeFigureOut">
               <a:rPr lang="en-US" smtClean="0"/>
-              <a:t>09-Apr-19</a:t>
+              <a:t>4/14/19</a:t>
             </a:fld>
             <a:endParaRPr lang="en-US"/>
           </a:p>
@@ -1168,7 +1169,7 @@
           <a:p>
             <a:fld id="{78C97017-6FC3-485B-9764-EAC9E56C1D49}" type="datetimeFigureOut">
               <a:rPr lang="en-US" smtClean="0"/>
-              <a:t>09-Apr-19</a:t>
+              <a:t>4/14/19</a:t>
             </a:fld>
             <a:endParaRPr lang="en-US"/>
           </a:p>
@@ -1413,7 +1414,7 @@
           <a:p>
             <a:fld id="{78C97017-6FC3-485B-9764-EAC9E56C1D49}" type="datetimeFigureOut">
               <a:rPr lang="en-US" smtClean="0"/>
-              <a:t>09-Apr-19</a:t>
+              <a:t>4/14/19</a:t>
             </a:fld>
             <a:endParaRPr lang="en-US"/>
           </a:p>
@@ -1698,7 +1699,7 @@
           <a:p>
             <a:fld id="{78C97017-6FC3-485B-9764-EAC9E56C1D49}" type="datetimeFigureOut">
               <a:rPr lang="en-US" smtClean="0"/>
-              <a:t>09-Apr-19</a:t>
+              <a:t>4/14/19</a:t>
             </a:fld>
             <a:endParaRPr lang="en-US"/>
           </a:p>
@@ -2117,7 +2118,7 @@
           <a:p>
             <a:fld id="{78C97017-6FC3-485B-9764-EAC9E56C1D49}" type="datetimeFigureOut">
               <a:rPr lang="en-US" smtClean="0"/>
-              <a:t>09-Apr-19</a:t>
+              <a:t>4/14/19</a:t>
             </a:fld>
             <a:endParaRPr lang="en-US"/>
           </a:p>
@@ -2234,7 +2235,7 @@
           <a:p>
             <a:fld id="{78C97017-6FC3-485B-9764-EAC9E56C1D49}" type="datetimeFigureOut">
               <a:rPr lang="en-US" smtClean="0"/>
-              <a:t>09-Apr-19</a:t>
+              <a:t>4/14/19</a:t>
             </a:fld>
             <a:endParaRPr lang="en-US"/>
           </a:p>
@@ -2329,7 +2330,7 @@
           <a:p>
             <a:fld id="{78C97017-6FC3-485B-9764-EAC9E56C1D49}" type="datetimeFigureOut">
               <a:rPr lang="en-US" smtClean="0"/>
-              <a:t>09-Apr-19</a:t>
+              <a:t>4/14/19</a:t>
             </a:fld>
             <a:endParaRPr lang="en-US"/>
           </a:p>
@@ -2604,7 +2605,7 @@
           <a:p>
             <a:fld id="{78C97017-6FC3-485B-9764-EAC9E56C1D49}" type="datetimeFigureOut">
               <a:rPr lang="en-US" smtClean="0"/>
-              <a:t>09-Apr-19</a:t>
+              <a:t>4/14/19</a:t>
             </a:fld>
             <a:endParaRPr lang="en-US"/>
           </a:p>
@@ -2856,7 +2857,7 @@
           <a:p>
             <a:fld id="{78C97017-6FC3-485B-9764-EAC9E56C1D49}" type="datetimeFigureOut">
               <a:rPr lang="en-US" smtClean="0"/>
-              <a:t>09-Apr-19</a:t>
+              <a:t>4/14/19</a:t>
             </a:fld>
             <a:endParaRPr lang="en-US"/>
           </a:p>
@@ -3067,7 +3068,7 @@
           <a:p>
             <a:fld id="{78C97017-6FC3-485B-9764-EAC9E56C1D49}" type="datetimeFigureOut">
               <a:rPr lang="en-US" smtClean="0"/>
-              <a:t>09-Apr-19</a:t>
+              <a:t>4/14/19</a:t>
             </a:fld>
             <a:endParaRPr lang="en-US"/>
           </a:p>
@@ -3572,7 +3573,7 @@
         </p:nvSpPr>
         <p:spPr>
           <a:xfrm>
-            <a:off x="883145" y="543946"/>
+            <a:off x="889700" y="486314"/>
             <a:ext cx="1455629" cy="346760"/>
           </a:xfrm>
           <a:prstGeom prst="rect">
@@ -4918,7 +4919,7 @@
           <p:cNvPr id="66" name="Straight Arrow Connector 65">
             <a:extLst>
               <a:ext uri="{FF2B5EF4-FFF2-40B4-BE49-F238E27FC236}">
-                <a16:creationId xmlns:a16="http://schemas.microsoft.com/office/drawing/2014/main" id="{39916E2E-195A-4DC8-B025-B05FA87E6796}"/>
+                <a16:creationId xmlns:a16="http://schemas.microsoft.com/office/drawing/2014/main" xmlns="" id="{39916E2E-195A-4DC8-B025-B05FA87E6796}"/>
               </a:ext>
             </a:extLst>
           </p:cNvPr>
@@ -4962,7 +4963,7 @@
           <p:cNvPr id="67" name="Straight Arrow Connector 66">
             <a:extLst>
               <a:ext uri="{FF2B5EF4-FFF2-40B4-BE49-F238E27FC236}">
-                <a16:creationId xmlns:a16="http://schemas.microsoft.com/office/drawing/2014/main" id="{D881596E-177C-4FDC-8E60-CAB90B3D5FAB}"/>
+                <a16:creationId xmlns:a16="http://schemas.microsoft.com/office/drawing/2014/main" xmlns="" id="{D881596E-177C-4FDC-8E60-CAB90B3D5FAB}"/>
               </a:ext>
             </a:extLst>
           </p:cNvPr>
@@ -5006,7 +5007,7 @@
           <p:cNvPr id="69" name="Straight Arrow Connector 68">
             <a:extLst>
               <a:ext uri="{FF2B5EF4-FFF2-40B4-BE49-F238E27FC236}">
-                <a16:creationId xmlns:a16="http://schemas.microsoft.com/office/drawing/2014/main" id="{7C9F21BC-13A9-471F-825A-2621FD36355F}"/>
+                <a16:creationId xmlns:a16="http://schemas.microsoft.com/office/drawing/2014/main" xmlns="" id="{7C9F21BC-13A9-471F-825A-2621FD36355F}"/>
               </a:ext>
             </a:extLst>
           </p:cNvPr>
@@ -5052,7 +5053,7 @@
           <p:cNvPr id="88" name="TextBox 87">
             <a:extLst>
               <a:ext uri="{FF2B5EF4-FFF2-40B4-BE49-F238E27FC236}">
-                <a16:creationId xmlns:a16="http://schemas.microsoft.com/office/drawing/2014/main" id="{B85C6184-7378-4E89-A338-72B1E5056F4F}"/>
+                <a16:creationId xmlns:a16="http://schemas.microsoft.com/office/drawing/2014/main" xmlns="" id="{B85C6184-7378-4E89-A338-72B1E5056F4F}"/>
               </a:ext>
             </a:extLst>
           </p:cNvPr>
@@ -5128,7 +5129,7 @@
           <p:cNvPr id="89" name="Straight Connector 88">
             <a:extLst>
               <a:ext uri="{FF2B5EF4-FFF2-40B4-BE49-F238E27FC236}">
-                <a16:creationId xmlns:a16="http://schemas.microsoft.com/office/drawing/2014/main" id="{E4E1C8CA-49DF-45D8-80A5-D5C8282EE927}"/>
+                <a16:creationId xmlns:a16="http://schemas.microsoft.com/office/drawing/2014/main" xmlns="" id="{E4E1C8CA-49DF-45D8-80A5-D5C8282EE927}"/>
               </a:ext>
             </a:extLst>
           </p:cNvPr>
@@ -5309,7 +5310,7 @@
           <p:cNvPr id="60" name="Straight Arrow Connector 59">
             <a:extLst>
               <a:ext uri="{FF2B5EF4-FFF2-40B4-BE49-F238E27FC236}">
-                <a16:creationId xmlns:a16="http://schemas.microsoft.com/office/drawing/2014/main" id="{7C9F21BC-13A9-471F-825A-2621FD36355F}"/>
+                <a16:creationId xmlns:a16="http://schemas.microsoft.com/office/drawing/2014/main" xmlns="" id="{7C9F21BC-13A9-471F-825A-2621FD36355F}"/>
               </a:ext>
             </a:extLst>
           </p:cNvPr>
@@ -5355,7 +5356,7 @@
           <p:cNvPr id="63" name="Straight Arrow Connector 62">
             <a:extLst>
               <a:ext uri="{FF2B5EF4-FFF2-40B4-BE49-F238E27FC236}">
-                <a16:creationId xmlns:a16="http://schemas.microsoft.com/office/drawing/2014/main" id="{7C9F21BC-13A9-471F-825A-2621FD36355F}"/>
+                <a16:creationId xmlns:a16="http://schemas.microsoft.com/office/drawing/2014/main" xmlns="" id="{7C9F21BC-13A9-471F-825A-2621FD36355F}"/>
               </a:ext>
             </a:extLst>
           </p:cNvPr>
@@ -5401,6 +5402,97 @@
     <p:extLst>
       <p:ext uri="{BB962C8B-B14F-4D97-AF65-F5344CB8AC3E}">
         <p14:creationId xmlns:p14="http://schemas.microsoft.com/office/powerpoint/2010/main" val="3945898909"/>
+      </p:ext>
+    </p:extLst>
+  </p:cSld>
+  <p:clrMapOvr>
+    <a:masterClrMapping/>
+  </p:clrMapOvr>
+</p:sld>
+</file>
+
+<file path=ppt/slides/slide2.xml><?xml version="1.0" encoding="utf-8"?>
+<p:sld xmlns:a="http://schemas.openxmlformats.org/drawingml/2006/main" xmlns:r="http://schemas.openxmlformats.org/officeDocument/2006/relationships" xmlns:p="http://schemas.openxmlformats.org/presentationml/2006/main">
+  <p:cSld>
+    <p:spTree>
+      <p:nvGrpSpPr>
+        <p:cNvPr id="1" name=""/>
+        <p:cNvGrpSpPr/>
+        <p:nvPr/>
+      </p:nvGrpSpPr>
+      <p:grpSpPr>
+        <a:xfrm>
+          <a:off x="0" y="0"/>
+          <a:ext cx="0" cy="0"/>
+          <a:chOff x="0" y="0"/>
+          <a:chExt cx="0" cy="0"/>
+        </a:xfrm>
+      </p:grpSpPr>
+      <p:sp>
+        <p:nvSpPr>
+          <p:cNvPr id="2" name="Rectangle 65"/>
+          <p:cNvSpPr/>
+          <p:nvPr/>
+        </p:nvSpPr>
+        <p:spPr>
+          <a:xfrm>
+            <a:off x="152400" y="152400"/>
+            <a:ext cx="5863964" cy="4343400"/>
+          </a:xfrm>
+          <a:prstGeom prst="roundRect">
+            <a:avLst>
+              <a:gd name="adj" fmla="val 3484"/>
+            </a:avLst>
+          </a:prstGeom>
+          <a:solidFill>
+            <a:schemeClr val="accent1">
+              <a:lumMod val="20000"/>
+              <a:lumOff val="80000"/>
+            </a:schemeClr>
+          </a:solidFill>
+          <a:ln w="19050">
+            <a:noFill/>
+          </a:ln>
+          <a:effectLst/>
+        </p:spPr>
+        <p:style>
+          <a:lnRef idx="1">
+            <a:schemeClr val="accent2"/>
+          </a:lnRef>
+          <a:fillRef idx="2">
+            <a:schemeClr val="accent2"/>
+          </a:fillRef>
+          <a:effectRef idx="1">
+            <a:schemeClr val="accent2"/>
+          </a:effectRef>
+          <a:fontRef idx="minor">
+            <a:schemeClr val="dk1"/>
+          </a:fontRef>
+        </p:style>
+        <p:txBody>
+          <a:bodyPr rtlCol="0" anchor="t"/>
+          <a:lstStyle/>
+          <a:p>
+            <a:r>
+              <a:rPr lang="en-US" sz="1200" b="1" dirty="0" smtClean="0">
+                <a:solidFill>
+                  <a:srgbClr val="0070C0"/>
+                </a:solidFill>
+              </a:rPr>
+              <a:t>Logic</a:t>
+            </a:r>
+            <a:endParaRPr lang="en-SG" sz="1200" b="1" dirty="0">
+              <a:solidFill>
+                <a:srgbClr val="0070C0"/>
+              </a:solidFill>
+            </a:endParaRPr>
+          </a:p>
+        </p:txBody>
+      </p:sp>
+    </p:spTree>
+    <p:extLst>
+      <p:ext uri="{BB962C8B-B14F-4D97-AF65-F5344CB8AC3E}">
+        <p14:creationId xmlns:p14="http://schemas.microsoft.com/office/powerpoint/2010/main" val="491741297"/>
       </p:ext>
     </p:extLst>
   </p:cSld>

</xml_diff>